<commit_message>
load static + favicon
</commit_message>
<xml_diff>
--- a/planilha/static/planilha/images/logo.pptx
+++ b/planilha/static/planilha/images/logo.pptx
@@ -6,6 +6,7 @@
   </p:sldMasterIdLst>
   <p:sldIdLst>
     <p:sldId id="256" r:id="rId2"/>
+    <p:sldId id="257" r:id="rId3"/>
   </p:sldIdLst>
   <p:sldSz cx="12192000" cy="6858000"/>
   <p:notesSz cx="6858000" cy="9144000"/>
@@ -259,7 +260,7 @@
           <a:p>
             <a:fld id="{F5140CA9-8380-46C9-A676-DB166645951D}" type="datetimeFigureOut">
               <a:rPr lang="pt-BR" smtClean="0"/>
-              <a:t>07/11/2025</a:t>
+              <a:t>14/11/2025</a:t>
             </a:fld>
             <a:endParaRPr lang="pt-BR"/>
           </a:p>
@@ -457,7 +458,7 @@
           <a:p>
             <a:fld id="{F5140CA9-8380-46C9-A676-DB166645951D}" type="datetimeFigureOut">
               <a:rPr lang="pt-BR" smtClean="0"/>
-              <a:t>07/11/2025</a:t>
+              <a:t>14/11/2025</a:t>
             </a:fld>
             <a:endParaRPr lang="pt-BR"/>
           </a:p>
@@ -665,7 +666,7 @@
           <a:p>
             <a:fld id="{F5140CA9-8380-46C9-A676-DB166645951D}" type="datetimeFigureOut">
               <a:rPr lang="pt-BR" smtClean="0"/>
-              <a:t>07/11/2025</a:t>
+              <a:t>14/11/2025</a:t>
             </a:fld>
             <a:endParaRPr lang="pt-BR"/>
           </a:p>
@@ -863,7 +864,7 @@
           <a:p>
             <a:fld id="{F5140CA9-8380-46C9-A676-DB166645951D}" type="datetimeFigureOut">
               <a:rPr lang="pt-BR" smtClean="0"/>
-              <a:t>07/11/2025</a:t>
+              <a:t>14/11/2025</a:t>
             </a:fld>
             <a:endParaRPr lang="pt-BR"/>
           </a:p>
@@ -1138,7 +1139,7 @@
           <a:p>
             <a:fld id="{F5140CA9-8380-46C9-A676-DB166645951D}" type="datetimeFigureOut">
               <a:rPr lang="pt-BR" smtClean="0"/>
-              <a:t>07/11/2025</a:t>
+              <a:t>14/11/2025</a:t>
             </a:fld>
             <a:endParaRPr lang="pt-BR"/>
           </a:p>
@@ -1403,7 +1404,7 @@
           <a:p>
             <a:fld id="{F5140CA9-8380-46C9-A676-DB166645951D}" type="datetimeFigureOut">
               <a:rPr lang="pt-BR" smtClean="0"/>
-              <a:t>07/11/2025</a:t>
+              <a:t>14/11/2025</a:t>
             </a:fld>
             <a:endParaRPr lang="pt-BR"/>
           </a:p>
@@ -1815,7 +1816,7 @@
           <a:p>
             <a:fld id="{F5140CA9-8380-46C9-A676-DB166645951D}" type="datetimeFigureOut">
               <a:rPr lang="pt-BR" smtClean="0"/>
-              <a:t>07/11/2025</a:t>
+              <a:t>14/11/2025</a:t>
             </a:fld>
             <a:endParaRPr lang="pt-BR"/>
           </a:p>
@@ -1956,7 +1957,7 @@
           <a:p>
             <a:fld id="{F5140CA9-8380-46C9-A676-DB166645951D}" type="datetimeFigureOut">
               <a:rPr lang="pt-BR" smtClean="0"/>
-              <a:t>07/11/2025</a:t>
+              <a:t>14/11/2025</a:t>
             </a:fld>
             <a:endParaRPr lang="pt-BR"/>
           </a:p>
@@ -2069,7 +2070,7 @@
           <a:p>
             <a:fld id="{F5140CA9-8380-46C9-A676-DB166645951D}" type="datetimeFigureOut">
               <a:rPr lang="pt-BR" smtClean="0"/>
-              <a:t>07/11/2025</a:t>
+              <a:t>14/11/2025</a:t>
             </a:fld>
             <a:endParaRPr lang="pt-BR"/>
           </a:p>
@@ -2380,7 +2381,7 @@
           <a:p>
             <a:fld id="{F5140CA9-8380-46C9-A676-DB166645951D}" type="datetimeFigureOut">
               <a:rPr lang="pt-BR" smtClean="0"/>
-              <a:t>07/11/2025</a:t>
+              <a:t>14/11/2025</a:t>
             </a:fld>
             <a:endParaRPr lang="pt-BR"/>
           </a:p>
@@ -2668,7 +2669,7 @@
           <a:p>
             <a:fld id="{F5140CA9-8380-46C9-A676-DB166645951D}" type="datetimeFigureOut">
               <a:rPr lang="pt-BR" smtClean="0"/>
-              <a:t>07/11/2025</a:t>
+              <a:t>14/11/2025</a:t>
             </a:fld>
             <a:endParaRPr lang="pt-BR"/>
           </a:p>
@@ -2909,7 +2910,7 @@
           <a:p>
             <a:fld id="{F5140CA9-8380-46C9-A676-DB166645951D}" type="datetimeFigureOut">
               <a:rPr lang="pt-BR" smtClean="0"/>
-              <a:t>07/11/2025</a:t>
+              <a:t>14/11/2025</a:t>
             </a:fld>
             <a:endParaRPr lang="pt-BR"/>
           </a:p>
@@ -3553,6 +3554,160 @@
     <p:extLst>
       <p:ext uri="{BB962C8B-B14F-4D97-AF65-F5344CB8AC3E}">
         <p14:creationId xmlns:p14="http://schemas.microsoft.com/office/powerpoint/2010/main" val="2030915156"/>
+      </p:ext>
+    </p:extLst>
+  </p:cSld>
+  <p:clrMapOvr>
+    <a:masterClrMapping/>
+  </p:clrMapOvr>
+</p:sld>
+</file>
+
+<file path=ppt/slides/slide2.xml><?xml version="1.0" encoding="utf-8"?>
+<p:sld xmlns:a="http://schemas.openxmlformats.org/drawingml/2006/main" xmlns:r="http://schemas.openxmlformats.org/officeDocument/2006/relationships" xmlns:p="http://schemas.openxmlformats.org/presentationml/2006/main">
+  <p:cSld>
+    <p:spTree>
+      <p:nvGrpSpPr>
+        <p:cNvPr id="1" name=""/>
+        <p:cNvGrpSpPr/>
+        <p:nvPr/>
+      </p:nvGrpSpPr>
+      <p:grpSpPr>
+        <a:xfrm>
+          <a:off x="0" y="0"/>
+          <a:ext cx="0" cy="0"/>
+          <a:chOff x="0" y="0"/>
+          <a:chExt cx="0" cy="0"/>
+        </a:xfrm>
+      </p:grpSpPr>
+      <p:sp>
+        <p:nvSpPr>
+          <p:cNvPr id="4" name="Retângulo 3">
+            <a:extLst>
+              <a:ext uri="{FF2B5EF4-FFF2-40B4-BE49-F238E27FC236}">
+                <a16:creationId xmlns:a16="http://schemas.microsoft.com/office/drawing/2014/main" id="{67C9B199-CD47-431B-EA1D-BFCBEDBBC860}"/>
+              </a:ext>
+            </a:extLst>
+          </p:cNvPr>
+          <p:cNvSpPr/>
+          <p:nvPr/>
+        </p:nvSpPr>
+        <p:spPr>
+          <a:xfrm>
+            <a:off x="3207340" y="2066201"/>
+            <a:ext cx="2652686" cy="1362799"/>
+          </a:xfrm>
+          <a:prstGeom prst="rect">
+            <a:avLst/>
+          </a:prstGeom>
+          <a:noFill/>
+          <a:ln>
+            <a:noFill/>
+          </a:ln>
+        </p:spPr>
+        <p:style>
+          <a:lnRef idx="0">
+            <a:scrgbClr r="0" g="0" b="0"/>
+          </a:lnRef>
+          <a:fillRef idx="0">
+            <a:scrgbClr r="0" g="0" b="0"/>
+          </a:fillRef>
+          <a:effectRef idx="0">
+            <a:scrgbClr r="0" g="0" b="0"/>
+          </a:effectRef>
+          <a:fontRef idx="minor">
+            <a:schemeClr val="dk1"/>
+          </a:fontRef>
+        </p:style>
+        <p:txBody>
+          <a:bodyPr lIns="0" tIns="0" rIns="0" bIns="0" rtlCol="0" anchor="ctr"/>
+          <a:lstStyle/>
+          <a:p>
+            <a:pPr algn="ctr"/>
+            <a:r>
+              <a:rPr lang="pt-BR" sz="9600" dirty="0">
+                <a:ln w="28575">
+                  <a:solidFill>
+                    <a:srgbClr val="7030A0"/>
+                  </a:solidFill>
+                </a:ln>
+                <a:solidFill>
+                  <a:srgbClr val="0070C0"/>
+                </a:solidFill>
+                <a:latin typeface="Amasis MT Pro Medium" panose="02040604050005020304" pitchFamily="18" charset="0"/>
+                <a:cs typeface="Aldhabi" panose="01000000000000000000" pitchFamily="2" charset="-78"/>
+              </a:rPr>
+              <a:t>i</a:t>
+            </a:r>
+            <a:endParaRPr lang="pt-BR" sz="9600" dirty="0">
+              <a:ln w="28575">
+                <a:solidFill>
+                  <a:srgbClr val="7030A0"/>
+                </a:solidFill>
+              </a:ln>
+              <a:solidFill>
+                <a:srgbClr val="0070C0"/>
+              </a:solidFill>
+            </a:endParaRPr>
+          </a:p>
+        </p:txBody>
+      </p:sp>
+      <p:sp>
+        <p:nvSpPr>
+          <p:cNvPr id="2" name="Elipse 1">
+            <a:extLst>
+              <a:ext uri="{FF2B5EF4-FFF2-40B4-BE49-F238E27FC236}">
+                <a16:creationId xmlns:a16="http://schemas.microsoft.com/office/drawing/2014/main" id="{25910E39-DCD5-E771-69EB-ED48594A87B6}"/>
+              </a:ext>
+            </a:extLst>
+          </p:cNvPr>
+          <p:cNvSpPr/>
+          <p:nvPr/>
+        </p:nvSpPr>
+        <p:spPr>
+          <a:xfrm>
+            <a:off x="3994016" y="2207933"/>
+            <a:ext cx="1079335" cy="1079335"/>
+          </a:xfrm>
+          <a:prstGeom prst="ellipse">
+            <a:avLst/>
+          </a:prstGeom>
+          <a:noFill/>
+          <a:ln w="76200">
+            <a:solidFill>
+              <a:srgbClr val="7030A0"/>
+            </a:solidFill>
+          </a:ln>
+        </p:spPr>
+        <p:style>
+          <a:lnRef idx="2">
+            <a:schemeClr val="accent1">
+              <a:shade val="15000"/>
+            </a:schemeClr>
+          </a:lnRef>
+          <a:fillRef idx="1">
+            <a:schemeClr val="accent1"/>
+          </a:fillRef>
+          <a:effectRef idx="0">
+            <a:schemeClr val="accent1"/>
+          </a:effectRef>
+          <a:fontRef idx="minor">
+            <a:schemeClr val="lt1"/>
+          </a:fontRef>
+        </p:style>
+        <p:txBody>
+          <a:bodyPr rtlCol="0" anchor="ctr"/>
+          <a:lstStyle/>
+          <a:p>
+            <a:pPr algn="ctr"/>
+            <a:endParaRPr lang="pt-BR"/>
+          </a:p>
+        </p:txBody>
+      </p:sp>
+    </p:spTree>
+    <p:extLst>
+      <p:ext uri="{BB962C8B-B14F-4D97-AF65-F5344CB8AC3E}">
+        <p14:creationId xmlns:p14="http://schemas.microsoft.com/office/powerpoint/2010/main" val="2809848469"/>
       </p:ext>
     </p:extLst>
   </p:cSld>

</xml_diff>